<commit_message>
Update Banner ( 更新封面 )
</commit_message>
<xml_diff>
--- a/src/assets/banner.pptx
+++ b/src/assets/banner.pptx
@@ -5,11 +5,13 @@
     <p:sldMasterId id="2147483768" r:id="rId1"/>
   </p:sldMasterIdLst>
   <p:notesMasterIdLst>
-    <p:notesMasterId r:id="rId4"/>
+    <p:notesMasterId r:id="rId6"/>
   </p:notesMasterIdLst>
   <p:sldIdLst>
-    <p:sldId id="262" r:id="rId2"/>
-    <p:sldId id="263" r:id="rId3"/>
+    <p:sldId id="270" r:id="rId2"/>
+    <p:sldId id="271" r:id="rId3"/>
+    <p:sldId id="262" r:id="rId4"/>
+    <p:sldId id="263" r:id="rId5"/>
   </p:sldIdLst>
   <p:sldSz cx="15840075" cy="4319588"/>
   <p:notesSz cx="6858000" cy="9144000"/>
@@ -209,7 +211,7 @@
           <a:p>
             <a:fld id="{7EF970CB-F914-40AE-97E3-E34CBD37C6ED}" type="datetimeFigureOut">
               <a:rPr lang="zh-CN" altLang="en-US" smtClean="0"/>
-              <a:t>2025/4/27</a:t>
+              <a:t>2025/7/16</a:t>
             </a:fld>
             <a:endParaRPr lang="zh-CN" altLang="en-US"/>
           </a:p>
@@ -607,7 +609,7 @@
           <a:p>
             <a:fld id="{12F9AB73-616F-42A9-B655-B8C4F74176AB}" type="datetimeFigureOut">
               <a:rPr lang="zh-CN" altLang="en-US" smtClean="0"/>
-              <a:t>2025/4/27</a:t>
+              <a:t>2025/7/16</a:t>
             </a:fld>
             <a:endParaRPr lang="zh-CN" altLang="en-US"/>
           </a:p>
@@ -777,7 +779,7 @@
           <a:p>
             <a:fld id="{12F9AB73-616F-42A9-B655-B8C4F74176AB}" type="datetimeFigureOut">
               <a:rPr lang="zh-CN" altLang="en-US" smtClean="0"/>
-              <a:t>2025/4/27</a:t>
+              <a:t>2025/7/16</a:t>
             </a:fld>
             <a:endParaRPr lang="zh-CN" altLang="en-US"/>
           </a:p>
@@ -957,7 +959,7 @@
           <a:p>
             <a:fld id="{12F9AB73-616F-42A9-B655-B8C4F74176AB}" type="datetimeFigureOut">
               <a:rPr lang="zh-CN" altLang="en-US" smtClean="0"/>
-              <a:t>2025/4/27</a:t>
+              <a:t>2025/7/16</a:t>
             </a:fld>
             <a:endParaRPr lang="zh-CN" altLang="en-US"/>
           </a:p>
@@ -1127,7 +1129,7 @@
           <a:p>
             <a:fld id="{12F9AB73-616F-42A9-B655-B8C4F74176AB}" type="datetimeFigureOut">
               <a:rPr lang="zh-CN" altLang="en-US" smtClean="0"/>
-              <a:t>2025/4/27</a:t>
+              <a:t>2025/7/16</a:t>
             </a:fld>
             <a:endParaRPr lang="zh-CN" altLang="en-US"/>
           </a:p>
@@ -1373,7 +1375,7 @@
           <a:p>
             <a:fld id="{12F9AB73-616F-42A9-B655-B8C4F74176AB}" type="datetimeFigureOut">
               <a:rPr lang="zh-CN" altLang="en-US" smtClean="0"/>
-              <a:t>2025/4/27</a:t>
+              <a:t>2025/7/16</a:t>
             </a:fld>
             <a:endParaRPr lang="zh-CN" altLang="en-US"/>
           </a:p>
@@ -1605,7 +1607,7 @@
           <a:p>
             <a:fld id="{12F9AB73-616F-42A9-B655-B8C4F74176AB}" type="datetimeFigureOut">
               <a:rPr lang="zh-CN" altLang="en-US" smtClean="0"/>
-              <a:t>2025/4/27</a:t>
+              <a:t>2025/7/16</a:t>
             </a:fld>
             <a:endParaRPr lang="zh-CN" altLang="en-US"/>
           </a:p>
@@ -1972,7 +1974,7 @@
           <a:p>
             <a:fld id="{12F9AB73-616F-42A9-B655-B8C4F74176AB}" type="datetimeFigureOut">
               <a:rPr lang="zh-CN" altLang="en-US" smtClean="0"/>
-              <a:t>2025/4/27</a:t>
+              <a:t>2025/7/16</a:t>
             </a:fld>
             <a:endParaRPr lang="zh-CN" altLang="en-US"/>
           </a:p>
@@ -2090,7 +2092,7 @@
           <a:p>
             <a:fld id="{12F9AB73-616F-42A9-B655-B8C4F74176AB}" type="datetimeFigureOut">
               <a:rPr lang="zh-CN" altLang="en-US" smtClean="0"/>
-              <a:t>2025/4/27</a:t>
+              <a:t>2025/7/16</a:t>
             </a:fld>
             <a:endParaRPr lang="zh-CN" altLang="en-US"/>
           </a:p>
@@ -2185,7 +2187,7 @@
           <a:p>
             <a:fld id="{12F9AB73-616F-42A9-B655-B8C4F74176AB}" type="datetimeFigureOut">
               <a:rPr lang="zh-CN" altLang="en-US" smtClean="0"/>
-              <a:t>2025/4/27</a:t>
+              <a:t>2025/7/16</a:t>
             </a:fld>
             <a:endParaRPr lang="zh-CN" altLang="en-US"/>
           </a:p>
@@ -2462,7 +2464,7 @@
           <a:p>
             <a:fld id="{12F9AB73-616F-42A9-B655-B8C4F74176AB}" type="datetimeFigureOut">
               <a:rPr lang="zh-CN" altLang="en-US" smtClean="0"/>
-              <a:t>2025/4/27</a:t>
+              <a:t>2025/7/16</a:t>
             </a:fld>
             <a:endParaRPr lang="zh-CN" altLang="en-US"/>
           </a:p>
@@ -2719,7 +2721,7 @@
           <a:p>
             <a:fld id="{12F9AB73-616F-42A9-B655-B8C4F74176AB}" type="datetimeFigureOut">
               <a:rPr lang="zh-CN" altLang="en-US" smtClean="0"/>
-              <a:t>2025/4/27</a:t>
+              <a:t>2025/7/16</a:t>
             </a:fld>
             <a:endParaRPr lang="zh-CN" altLang="en-US"/>
           </a:p>
@@ -2932,7 +2934,7 @@
           <a:p>
             <a:fld id="{12F9AB73-616F-42A9-B655-B8C4F74176AB}" type="datetimeFigureOut">
               <a:rPr lang="zh-CN" altLang="en-US" smtClean="0"/>
-              <a:t>2025/4/27</a:t>
+              <a:t>2025/7/16</a:t>
             </a:fld>
             <a:endParaRPr lang="zh-CN" altLang="en-US"/>
           </a:p>
@@ -3321,6 +3323,690 @@
 </file>
 
 <file path=ppt/slides/slide1.xml><?xml version="1.0" encoding="utf-8"?>
+<p:sld xmlns:a="http://schemas.openxmlformats.org/drawingml/2006/main" xmlns:r="http://schemas.openxmlformats.org/officeDocument/2006/relationships" xmlns:p="http://schemas.openxmlformats.org/presentationml/2006/main">
+  <p:cSld>
+    <p:spTree>
+      <p:nvGrpSpPr>
+        <p:cNvPr id="1" name="">
+          <a:extLst>
+            <a:ext uri="{FF2B5EF4-FFF2-40B4-BE49-F238E27FC236}">
+              <a16:creationId xmlns:a16="http://schemas.microsoft.com/office/drawing/2014/main" id="{33863E1B-9E6D-A66E-6D9A-1300D9FE0156}"/>
+            </a:ext>
+          </a:extLst>
+        </p:cNvPr>
+        <p:cNvGrpSpPr/>
+        <p:nvPr/>
+      </p:nvGrpSpPr>
+      <p:grpSpPr>
+        <a:xfrm>
+          <a:off x="0" y="0"/>
+          <a:ext cx="0" cy="0"/>
+          <a:chOff x="0" y="0"/>
+          <a:chExt cx="0" cy="0"/>
+        </a:xfrm>
+      </p:grpSpPr>
+      <p:grpSp>
+        <p:nvGrpSpPr>
+          <p:cNvPr id="2" name="组合 1">
+            <a:extLst>
+              <a:ext uri="{FF2B5EF4-FFF2-40B4-BE49-F238E27FC236}">
+                <a16:creationId xmlns:a16="http://schemas.microsoft.com/office/drawing/2014/main" id="{6BD76772-5A79-859C-D91F-7B43AB66AE6D}"/>
+              </a:ext>
+            </a:extLst>
+          </p:cNvPr>
+          <p:cNvGrpSpPr/>
+          <p:nvPr/>
+        </p:nvGrpSpPr>
+        <p:grpSpPr>
+          <a:xfrm>
+            <a:off x="2909" y="0"/>
+            <a:ext cx="15834257" cy="4319589"/>
+            <a:chOff x="-214284" y="-208937"/>
+            <a:chExt cx="8802524" cy="2373933"/>
+          </a:xfrm>
+          <a:solidFill>
+            <a:srgbClr val="F0F4FA"/>
+          </a:solidFill>
+        </p:grpSpPr>
+        <p:sp>
+          <p:nvSpPr>
+            <p:cNvPr id="5" name="矩形: 圆角 4">
+              <a:extLst>
+                <a:ext uri="{FF2B5EF4-FFF2-40B4-BE49-F238E27FC236}">
+                  <a16:creationId xmlns:a16="http://schemas.microsoft.com/office/drawing/2014/main" id="{A8EE4F17-5A1F-2339-453D-7F619649D849}"/>
+                </a:ext>
+              </a:extLst>
+            </p:cNvPr>
+            <p:cNvSpPr/>
+            <p:nvPr/>
+          </p:nvSpPr>
+          <p:spPr>
+            <a:xfrm>
+              <a:off x="-214284" y="-208937"/>
+              <a:ext cx="8802524" cy="2373933"/>
+            </a:xfrm>
+            <a:prstGeom prst="roundRect">
+              <a:avLst>
+                <a:gd name="adj" fmla="val 3923"/>
+              </a:avLst>
+            </a:prstGeom>
+            <a:grpFill/>
+            <a:ln w="9525">
+              <a:noFill/>
+            </a:ln>
+          </p:spPr>
+          <p:style>
+            <a:lnRef idx="2">
+              <a:schemeClr val="accent1">
+                <a:shade val="15000"/>
+              </a:schemeClr>
+            </a:lnRef>
+            <a:fillRef idx="1">
+              <a:schemeClr val="accent1"/>
+            </a:fillRef>
+            <a:effectRef idx="0">
+              <a:schemeClr val="accent1"/>
+            </a:effectRef>
+            <a:fontRef idx="minor">
+              <a:schemeClr val="lt1"/>
+            </a:fontRef>
+          </p:style>
+          <p:txBody>
+            <a:bodyPr lIns="17594" tIns="17594" rIns="17594" bIns="17594" rtlCol="0" anchor="ctr"/>
+            <a:lstStyle/>
+            <a:p>
+              <a:pPr algn="ctr"/>
+              <a:endParaRPr lang="zh-CN" altLang="en-US" sz="2443">
+                <a:solidFill>
+                  <a:schemeClr val="tx1"/>
+                </a:solidFill>
+                <a:latin typeface="微软雅黑" panose="020B0503020204020204" pitchFamily="34" charset="-122"/>
+                <a:ea typeface="微软雅黑" panose="020B0503020204020204" pitchFamily="34" charset="-122"/>
+              </a:endParaRPr>
+            </a:p>
+          </p:txBody>
+        </p:sp>
+        <p:sp>
+          <p:nvSpPr>
+            <p:cNvPr id="9" name="矩形 8">
+              <a:extLst>
+                <a:ext uri="{FF2B5EF4-FFF2-40B4-BE49-F238E27FC236}">
+                  <a16:creationId xmlns:a16="http://schemas.microsoft.com/office/drawing/2014/main" id="{EC452E52-2246-2EF6-65E5-B7A877B1A02D}"/>
+                </a:ext>
+              </a:extLst>
+            </p:cNvPr>
+            <p:cNvSpPr/>
+            <p:nvPr/>
+          </p:nvSpPr>
+          <p:spPr>
+            <a:xfrm>
+              <a:off x="1238882" y="19425"/>
+              <a:ext cx="5896192" cy="732918"/>
+            </a:xfrm>
+            <a:prstGeom prst="rect">
+              <a:avLst/>
+            </a:prstGeom>
+            <a:grpFill/>
+            <a:effectLst/>
+          </p:spPr>
+          <p:txBody>
+            <a:bodyPr wrap="none" lIns="223434" tIns="111717" rIns="223434" bIns="111717">
+              <a:spAutoFit/>
+            </a:bodyPr>
+            <a:lstStyle/>
+            <a:p>
+              <a:pPr algn="ctr"/>
+              <a:r>
+                <a:rPr lang="en-US" altLang="zh-CN" sz="7200" b="1" spc="400">
+                  <a:ln w="0"/>
+                  <a:solidFill>
+                    <a:srgbClr val="1F2F56"/>
+                  </a:solidFill>
+                  <a:effectLst>
+                    <a:outerShdw blurRad="50800" dist="38100" dir="5400000" algn="t" rotWithShape="0">
+                      <a:prstClr val="black">
+                        <a:alpha val="40000"/>
+                      </a:prstClr>
+                    </a:outerShdw>
+                  </a:effectLst>
+                  <a:latin typeface="Century Schoolbook" panose="02040604050505020304" pitchFamily="18" charset="0"/>
+                  <a:ea typeface="微软雅黑" panose="020B0503020204020204" pitchFamily="34" charset="-122"/>
+                </a:rPr>
+                <a:t>LLM-RL-Visualized</a:t>
+              </a:r>
+              <a:endParaRPr lang="zh-CN" altLang="en-US" sz="7200" b="1" spc="400">
+                <a:ln w="0"/>
+                <a:solidFill>
+                  <a:srgbClr val="1F2F56"/>
+                </a:solidFill>
+                <a:effectLst>
+                  <a:outerShdw blurRad="50800" dist="38100" dir="5400000" algn="t" rotWithShape="0">
+                    <a:prstClr val="black">
+                      <a:alpha val="40000"/>
+                    </a:prstClr>
+                  </a:outerShdw>
+                </a:effectLst>
+                <a:latin typeface="Century Schoolbook" panose="02040604050505020304" pitchFamily="18" charset="0"/>
+                <a:ea typeface="微软雅黑" panose="020B0503020204020204" pitchFamily="34" charset="-122"/>
+              </a:endParaRPr>
+            </a:p>
+          </p:txBody>
+        </p:sp>
+      </p:grpSp>
+      <p:sp>
+        <p:nvSpPr>
+          <p:cNvPr id="3" name="文本框 2">
+            <a:extLst>
+              <a:ext uri="{FF2B5EF4-FFF2-40B4-BE49-F238E27FC236}">
+                <a16:creationId xmlns:a16="http://schemas.microsoft.com/office/drawing/2014/main" id="{ADEC5DE5-F375-0D43-57EF-CB68A78075FF}"/>
+              </a:ext>
+            </a:extLst>
+          </p:cNvPr>
+          <p:cNvSpPr txBox="1"/>
+          <p:nvPr/>
+        </p:nvSpPr>
+        <p:spPr>
+          <a:xfrm>
+            <a:off x="2868157" y="3321454"/>
+            <a:ext cx="9534427" cy="461665"/>
+          </a:xfrm>
+          <a:prstGeom prst="rect">
+            <a:avLst/>
+          </a:prstGeom>
+          <a:noFill/>
+        </p:spPr>
+        <p:txBody>
+          <a:bodyPr wrap="square" rtlCol="0">
+            <a:spAutoFit/>
+          </a:bodyPr>
+          <a:lstStyle/>
+          <a:p>
+            <a:pPr algn="ctr"/>
+            <a:r>
+              <a:rPr lang="en-US" altLang="zh-CN" sz="2400">
+                <a:solidFill>
+                  <a:srgbClr val="375A7F"/>
+                </a:solidFill>
+                <a:latin typeface="Lucida Bright" panose="02040602050505020304" pitchFamily="18" charset="0"/>
+                <a:ea typeface="方正姚体" panose="02010601030101010101" pitchFamily="2" charset="-122"/>
+              </a:rPr>
+              <a:t>Changye Yu — Author of </a:t>
+            </a:r>
+            <a:r>
+              <a:rPr lang="en-US" altLang="zh-CN" sz="2400" i="1">
+                <a:solidFill>
+                  <a:srgbClr val="375A7F"/>
+                </a:solidFill>
+                <a:latin typeface="Lucida Bright" panose="02040602050505020304" pitchFamily="18" charset="0"/>
+                <a:ea typeface="方正姚体" panose="02010601030101010101" pitchFamily="2" charset="-122"/>
+              </a:rPr>
+              <a:t>Large Model Algorithms</a:t>
+            </a:r>
+          </a:p>
+        </p:txBody>
+      </p:sp>
+      <p:sp>
+        <p:nvSpPr>
+          <p:cNvPr id="4" name="矩形 3">
+            <a:extLst>
+              <a:ext uri="{FF2B5EF4-FFF2-40B4-BE49-F238E27FC236}">
+                <a16:creationId xmlns:a16="http://schemas.microsoft.com/office/drawing/2014/main" id="{C1388119-74B2-2FD5-90FC-1E30B28A4513}"/>
+              </a:ext>
+            </a:extLst>
+          </p:cNvPr>
+          <p:cNvSpPr/>
+          <p:nvPr/>
+        </p:nvSpPr>
+        <p:spPr>
+          <a:xfrm>
+            <a:off x="3286322" y="1701485"/>
+            <a:ext cx="9267428" cy="902724"/>
+          </a:xfrm>
+          <a:prstGeom prst="rect">
+            <a:avLst/>
+          </a:prstGeom>
+          <a:noFill/>
+          <a:effectLst/>
+        </p:spPr>
+        <p:txBody>
+          <a:bodyPr wrap="none" lIns="223434" tIns="111717" rIns="223434" bIns="111717">
+            <a:spAutoFit/>
+          </a:bodyPr>
+          <a:lstStyle/>
+          <a:p>
+            <a:pPr algn="ctr"/>
+            <a:r>
+              <a:rPr lang="en-US" altLang="zh-CN" sz="4400" spc="-100">
+                <a:ln w="0"/>
+                <a:solidFill>
+                  <a:srgbClr val="375A7F"/>
+                </a:solidFill>
+                <a:latin typeface="Cambria" panose="02040503050406030204" pitchFamily="18" charset="0"/>
+                <a:ea typeface="Cambria" panose="02040503050406030204" pitchFamily="18" charset="0"/>
+              </a:rPr>
+              <a:t>LLM · RL · DPO · GRPO · SFT · RAG  ···</a:t>
+            </a:r>
+            <a:r>
+              <a:rPr lang="zh-CN" altLang="en-US" sz="4400" spc="-100">
+                <a:ln w="0"/>
+                <a:solidFill>
+                  <a:srgbClr val="375A7F"/>
+                </a:solidFill>
+                <a:latin typeface="Cambria" panose="02040503050406030204" pitchFamily="18" charset="0"/>
+                <a:ea typeface="微软雅黑" panose="020B0503020204020204" pitchFamily="34" charset="-122"/>
+              </a:rPr>
+              <a:t> </a:t>
+            </a:r>
+            <a:endParaRPr lang="en-US" altLang="zh-CN" sz="4400" spc="-100">
+              <a:ln w="0"/>
+              <a:solidFill>
+                <a:srgbClr val="375A7F"/>
+              </a:solidFill>
+              <a:latin typeface="Cambria" panose="02040503050406030204" pitchFamily="18" charset="0"/>
+              <a:ea typeface="Cambria" panose="02040503050406030204" pitchFamily="18" charset="0"/>
+            </a:endParaRPr>
+          </a:p>
+        </p:txBody>
+      </p:sp>
+    </p:spTree>
+    <p:extLst>
+      <p:ext uri="{BB962C8B-B14F-4D97-AF65-F5344CB8AC3E}">
+        <p14:creationId xmlns:p14="http://schemas.microsoft.com/office/powerpoint/2010/main" val="3492587090"/>
+      </p:ext>
+    </p:extLst>
+  </p:cSld>
+  <p:clrMapOvr>
+    <a:masterClrMapping/>
+  </p:clrMapOvr>
+</p:sld>
+</file>
+
+<file path=ppt/slides/slide2.xml><?xml version="1.0" encoding="utf-8"?>
+<p:sld xmlns:a="http://schemas.openxmlformats.org/drawingml/2006/main" xmlns:r="http://schemas.openxmlformats.org/officeDocument/2006/relationships" xmlns:p="http://schemas.openxmlformats.org/presentationml/2006/main">
+  <p:cSld>
+    <p:spTree>
+      <p:nvGrpSpPr>
+        <p:cNvPr id="1" name="">
+          <a:extLst>
+            <a:ext uri="{FF2B5EF4-FFF2-40B4-BE49-F238E27FC236}">
+              <a16:creationId xmlns:a16="http://schemas.microsoft.com/office/drawing/2014/main" id="{C3AC548C-D7AA-8C3F-4366-C6A18926C362}"/>
+            </a:ext>
+          </a:extLst>
+        </p:cNvPr>
+        <p:cNvGrpSpPr/>
+        <p:nvPr/>
+      </p:nvGrpSpPr>
+      <p:grpSpPr>
+        <a:xfrm>
+          <a:off x="0" y="0"/>
+          <a:ext cx="0" cy="0"/>
+          <a:chOff x="0" y="0"/>
+          <a:chExt cx="0" cy="0"/>
+        </a:xfrm>
+      </p:grpSpPr>
+      <p:grpSp>
+        <p:nvGrpSpPr>
+          <p:cNvPr id="2" name="组合 1">
+            <a:extLst>
+              <a:ext uri="{FF2B5EF4-FFF2-40B4-BE49-F238E27FC236}">
+                <a16:creationId xmlns:a16="http://schemas.microsoft.com/office/drawing/2014/main" id="{3E63BB22-D832-6380-558A-511E0E82B3BF}"/>
+              </a:ext>
+            </a:extLst>
+          </p:cNvPr>
+          <p:cNvGrpSpPr/>
+          <p:nvPr/>
+        </p:nvGrpSpPr>
+        <p:grpSpPr>
+          <a:xfrm>
+            <a:off x="2909" y="0"/>
+            <a:ext cx="15834257" cy="4319589"/>
+            <a:chOff x="-214284" y="-208937"/>
+            <a:chExt cx="8802524" cy="2373933"/>
+          </a:xfrm>
+          <a:solidFill>
+            <a:srgbClr val="F0F4FA"/>
+          </a:solidFill>
+        </p:grpSpPr>
+        <p:sp>
+          <p:nvSpPr>
+            <p:cNvPr id="5" name="矩形: 圆角 4">
+              <a:extLst>
+                <a:ext uri="{FF2B5EF4-FFF2-40B4-BE49-F238E27FC236}">
+                  <a16:creationId xmlns:a16="http://schemas.microsoft.com/office/drawing/2014/main" id="{C2386EC9-4C4B-2DCE-843E-E2E67C839191}"/>
+                </a:ext>
+              </a:extLst>
+            </p:cNvPr>
+            <p:cNvSpPr/>
+            <p:nvPr/>
+          </p:nvSpPr>
+          <p:spPr>
+            <a:xfrm>
+              <a:off x="-214284" y="-208937"/>
+              <a:ext cx="8802524" cy="2373933"/>
+            </a:xfrm>
+            <a:prstGeom prst="roundRect">
+              <a:avLst>
+                <a:gd name="adj" fmla="val 3923"/>
+              </a:avLst>
+            </a:prstGeom>
+            <a:grpFill/>
+            <a:ln w="9525">
+              <a:noFill/>
+            </a:ln>
+          </p:spPr>
+          <p:style>
+            <a:lnRef idx="2">
+              <a:schemeClr val="accent1">
+                <a:shade val="15000"/>
+              </a:schemeClr>
+            </a:lnRef>
+            <a:fillRef idx="1">
+              <a:schemeClr val="accent1"/>
+            </a:fillRef>
+            <a:effectRef idx="0">
+              <a:schemeClr val="accent1"/>
+            </a:effectRef>
+            <a:fontRef idx="minor">
+              <a:schemeClr val="lt1"/>
+            </a:fontRef>
+          </p:style>
+          <p:txBody>
+            <a:bodyPr lIns="17594" tIns="17594" rIns="17594" bIns="17594" rtlCol="0" anchor="ctr"/>
+            <a:lstStyle/>
+            <a:p>
+              <a:pPr algn="ctr"/>
+              <a:endParaRPr lang="zh-CN" altLang="en-US" sz="2443">
+                <a:solidFill>
+                  <a:schemeClr val="tx1"/>
+                </a:solidFill>
+                <a:latin typeface="微软雅黑" panose="020B0503020204020204" pitchFamily="34" charset="-122"/>
+                <a:ea typeface="微软雅黑" panose="020B0503020204020204" pitchFamily="34" charset="-122"/>
+              </a:endParaRPr>
+            </a:p>
+          </p:txBody>
+        </p:sp>
+        <p:sp>
+          <p:nvSpPr>
+            <p:cNvPr id="9" name="矩形 8">
+              <a:extLst>
+                <a:ext uri="{FF2B5EF4-FFF2-40B4-BE49-F238E27FC236}">
+                  <a16:creationId xmlns:a16="http://schemas.microsoft.com/office/drawing/2014/main" id="{C7F36FA4-1FBC-2FFE-9E68-09C4EB2976B7}"/>
+                </a:ext>
+              </a:extLst>
+            </p:cNvPr>
+            <p:cNvSpPr/>
+            <p:nvPr/>
+          </p:nvSpPr>
+          <p:spPr>
+            <a:xfrm>
+              <a:off x="542905" y="145725"/>
+              <a:ext cx="7288146" cy="580687"/>
+            </a:xfrm>
+            <a:prstGeom prst="rect">
+              <a:avLst/>
+            </a:prstGeom>
+            <a:grpFill/>
+            <a:effectLst/>
+          </p:spPr>
+          <p:txBody>
+            <a:bodyPr wrap="none" lIns="223434" tIns="111717" rIns="223434" bIns="111717">
+              <a:spAutoFit/>
+            </a:bodyPr>
+            <a:lstStyle/>
+            <a:p>
+              <a:pPr algn="ctr"/>
+              <a:r>
+                <a:rPr lang="zh-CN" altLang="en-US" sz="5400" b="1" spc="100">
+                  <a:ln w="0"/>
+                  <a:solidFill>
+                    <a:srgbClr val="1F2F56"/>
+                  </a:solidFill>
+                  <a:effectLst>
+                    <a:outerShdw blurRad="50800" dist="38100" dir="5400000" algn="t" rotWithShape="0">
+                      <a:prstClr val="black">
+                        <a:alpha val="40000"/>
+                      </a:prstClr>
+                    </a:outerShdw>
+                  </a:effectLst>
+                  <a:latin typeface="微软雅黑" panose="020B0503020204020204" pitchFamily="34" charset="-122"/>
+                  <a:ea typeface="微软雅黑" panose="020B0503020204020204" pitchFamily="34" charset="-122"/>
+                </a:rPr>
+                <a:t>图解大模型算法  </a:t>
+              </a:r>
+              <a:r>
+                <a:rPr lang="en-US" altLang="zh-CN" sz="5400" b="1" spc="100">
+                  <a:ln w="0"/>
+                  <a:solidFill>
+                    <a:srgbClr val="1F2F56"/>
+                  </a:solidFill>
+                  <a:effectLst>
+                    <a:outerShdw blurRad="50800" dist="38100" dir="5400000" algn="t" rotWithShape="0">
+                      <a:prstClr val="black">
+                        <a:alpha val="40000"/>
+                      </a:prstClr>
+                    </a:outerShdw>
+                  </a:effectLst>
+                  <a:latin typeface="微软雅黑" panose="020B0503020204020204" pitchFamily="34" charset="-122"/>
+                  <a:ea typeface="微软雅黑" panose="020B0503020204020204" pitchFamily="34" charset="-122"/>
+                </a:rPr>
+                <a:t>|  </a:t>
+              </a:r>
+              <a:r>
+                <a:rPr lang="en-US" altLang="zh-CN" sz="5400" b="1" spc="100">
+                  <a:ln w="0"/>
+                  <a:solidFill>
+                    <a:srgbClr val="1F2F56"/>
+                  </a:solidFill>
+                  <a:effectLst>
+                    <a:outerShdw blurRad="50800" dist="38100" dir="5400000" algn="t" rotWithShape="0">
+                      <a:prstClr val="black">
+                        <a:alpha val="40000"/>
+                      </a:prstClr>
+                    </a:outerShdw>
+                  </a:effectLst>
+                  <a:latin typeface="Lucida Bright" panose="02040602050505020304" pitchFamily="18" charset="0"/>
+                  <a:ea typeface="微软雅黑" panose="020B0503020204020204" pitchFamily="34" charset="-122"/>
+                </a:rPr>
+                <a:t>LLM-RL-Visualized</a:t>
+              </a:r>
+              <a:endParaRPr lang="zh-CN" altLang="en-US" sz="5400" b="1" spc="100">
+                <a:ln w="0"/>
+                <a:solidFill>
+                  <a:srgbClr val="1F2F56"/>
+                </a:solidFill>
+                <a:effectLst>
+                  <a:outerShdw blurRad="50800" dist="38100" dir="5400000" algn="t" rotWithShape="0">
+                    <a:prstClr val="black">
+                      <a:alpha val="40000"/>
+                    </a:prstClr>
+                  </a:outerShdw>
+                </a:effectLst>
+                <a:latin typeface="Lucida Bright" panose="02040602050505020304" pitchFamily="18" charset="0"/>
+                <a:ea typeface="微软雅黑" panose="020B0503020204020204" pitchFamily="34" charset="-122"/>
+              </a:endParaRPr>
+            </a:p>
+          </p:txBody>
+        </p:sp>
+      </p:grpSp>
+      <p:sp>
+        <p:nvSpPr>
+          <p:cNvPr id="3" name="文本框 2">
+            <a:extLst>
+              <a:ext uri="{FF2B5EF4-FFF2-40B4-BE49-F238E27FC236}">
+                <a16:creationId xmlns:a16="http://schemas.microsoft.com/office/drawing/2014/main" id="{7DD8F02C-D344-5A6D-6575-94ED7A5673DE}"/>
+              </a:ext>
+            </a:extLst>
+          </p:cNvPr>
+          <p:cNvSpPr txBox="1"/>
+          <p:nvPr/>
+        </p:nvSpPr>
+        <p:spPr>
+          <a:xfrm>
+            <a:off x="2868157" y="3321454"/>
+            <a:ext cx="9534427" cy="538609"/>
+          </a:xfrm>
+          <a:prstGeom prst="rect">
+            <a:avLst/>
+          </a:prstGeom>
+          <a:noFill/>
+        </p:spPr>
+        <p:txBody>
+          <a:bodyPr wrap="square" rtlCol="0">
+            <a:spAutoFit/>
+          </a:bodyPr>
+          <a:lstStyle/>
+          <a:p>
+            <a:pPr algn="ctr"/>
+            <a:r>
+              <a:rPr lang="zh-CN" altLang="en-US" sz="2900">
+                <a:solidFill>
+                  <a:srgbClr val="375A7F"/>
+                </a:solidFill>
+                <a:latin typeface="方正姚体" panose="02010601030101010101" pitchFamily="2" charset="-122"/>
+                <a:ea typeface="方正姚体" panose="02010601030101010101" pitchFamily="2" charset="-122"/>
+              </a:rPr>
+              <a:t>畅销书</a:t>
+            </a:r>
+            <a:r>
+              <a:rPr lang="en-US" altLang="zh-CN" sz="2900">
+                <a:solidFill>
+                  <a:srgbClr val="375A7F"/>
+                </a:solidFill>
+                <a:latin typeface="方正姚体" panose="02010601030101010101" pitchFamily="2" charset="-122"/>
+                <a:ea typeface="方正姚体" panose="02010601030101010101" pitchFamily="2" charset="-122"/>
+              </a:rPr>
+              <a:t>《</a:t>
+            </a:r>
+            <a:r>
+              <a:rPr lang="zh-CN" altLang="en-US" sz="2900">
+                <a:solidFill>
+                  <a:srgbClr val="375A7F"/>
+                </a:solidFill>
+                <a:latin typeface="方正姚体" panose="02010601030101010101" pitchFamily="2" charset="-122"/>
+                <a:ea typeface="方正姚体" panose="02010601030101010101" pitchFamily="2" charset="-122"/>
+              </a:rPr>
+              <a:t>大模型算法</a:t>
+            </a:r>
+            <a:r>
+              <a:rPr lang="en-US" altLang="zh-CN" sz="2900">
+                <a:solidFill>
+                  <a:srgbClr val="375A7F"/>
+                </a:solidFill>
+                <a:latin typeface="方正姚体" panose="02010601030101010101" pitchFamily="2" charset="-122"/>
+                <a:ea typeface="方正姚体" panose="02010601030101010101" pitchFamily="2" charset="-122"/>
+              </a:rPr>
+              <a:t>》</a:t>
+            </a:r>
+            <a:r>
+              <a:rPr lang="zh-CN" altLang="en-US" sz="2900">
+                <a:solidFill>
+                  <a:srgbClr val="375A7F"/>
+                </a:solidFill>
+                <a:latin typeface="方正姚体" panose="02010601030101010101" pitchFamily="2" charset="-122"/>
+                <a:ea typeface="方正姚体" panose="02010601030101010101" pitchFamily="2" charset="-122"/>
+              </a:rPr>
+              <a:t>作者</a:t>
+            </a:r>
+            <a:r>
+              <a:rPr lang="en-US" altLang="zh-CN" sz="2900">
+                <a:solidFill>
+                  <a:srgbClr val="375A7F"/>
+                </a:solidFill>
+                <a:latin typeface="方正姚体" panose="02010601030101010101" pitchFamily="2" charset="-122"/>
+                <a:ea typeface="方正姚体" panose="02010601030101010101" pitchFamily="2" charset="-122"/>
+              </a:rPr>
+              <a:t>·</a:t>
+            </a:r>
+            <a:r>
+              <a:rPr lang="zh-CN" altLang="en-US" sz="2900">
+                <a:solidFill>
+                  <a:srgbClr val="375A7F"/>
+                </a:solidFill>
+                <a:latin typeface="方正姚体" panose="02010601030101010101" pitchFamily="2" charset="-122"/>
+                <a:ea typeface="方正姚体" panose="02010601030101010101" pitchFamily="2" charset="-122"/>
+              </a:rPr>
+              <a:t>余昌叶</a:t>
+            </a:r>
+          </a:p>
+        </p:txBody>
+      </p:sp>
+      <p:sp>
+        <p:nvSpPr>
+          <p:cNvPr id="4" name="矩形 3">
+            <a:extLst>
+              <a:ext uri="{FF2B5EF4-FFF2-40B4-BE49-F238E27FC236}">
+                <a16:creationId xmlns:a16="http://schemas.microsoft.com/office/drawing/2014/main" id="{EDDA05DA-335F-9E2C-2C64-1900880D1261}"/>
+              </a:ext>
+            </a:extLst>
+          </p:cNvPr>
+          <p:cNvSpPr/>
+          <p:nvPr/>
+        </p:nvSpPr>
+        <p:spPr>
+          <a:xfrm>
+            <a:off x="3220443" y="1775252"/>
+            <a:ext cx="9368865" cy="933502"/>
+          </a:xfrm>
+          <a:prstGeom prst="rect">
+            <a:avLst/>
+          </a:prstGeom>
+          <a:noFill/>
+          <a:effectLst/>
+        </p:spPr>
+        <p:txBody>
+          <a:bodyPr wrap="none" lIns="223434" tIns="111717" rIns="223434" bIns="111717">
+            <a:spAutoFit/>
+          </a:bodyPr>
+          <a:lstStyle/>
+          <a:p>
+            <a:pPr algn="ctr"/>
+            <a:r>
+              <a:rPr lang="en-US" altLang="zh-CN" sz="4600" spc="-100">
+                <a:ln w="0"/>
+                <a:solidFill>
+                  <a:srgbClr val="375A7F"/>
+                </a:solidFill>
+                <a:latin typeface="Cambria" panose="02040503050406030204" pitchFamily="18" charset="0"/>
+                <a:ea typeface="Cambria" panose="02040503050406030204" pitchFamily="18" charset="0"/>
+              </a:rPr>
+              <a:t>LLM · RL · DPO · GRPO · SFT · RAG  ···</a:t>
+            </a:r>
+            <a:r>
+              <a:rPr lang="zh-CN" altLang="en-US" sz="4600" spc="-100">
+                <a:ln w="0"/>
+                <a:solidFill>
+                  <a:srgbClr val="375A7F"/>
+                </a:solidFill>
+                <a:latin typeface="Cambria" panose="02040503050406030204" pitchFamily="18" charset="0"/>
+                <a:ea typeface="微软雅黑" panose="020B0503020204020204" pitchFamily="34" charset="-122"/>
+              </a:rPr>
+              <a:t> </a:t>
+            </a:r>
+            <a:endParaRPr lang="en-US" altLang="zh-CN" sz="4600" spc="-100">
+              <a:ln w="0"/>
+              <a:solidFill>
+                <a:srgbClr val="375A7F"/>
+              </a:solidFill>
+              <a:latin typeface="Cambria" panose="02040503050406030204" pitchFamily="18" charset="0"/>
+              <a:ea typeface="Cambria" panose="02040503050406030204" pitchFamily="18" charset="0"/>
+            </a:endParaRPr>
+          </a:p>
+        </p:txBody>
+      </p:sp>
+    </p:spTree>
+    <p:extLst>
+      <p:ext uri="{BB962C8B-B14F-4D97-AF65-F5344CB8AC3E}">
+        <p14:creationId xmlns:p14="http://schemas.microsoft.com/office/powerpoint/2010/main" val="523923817"/>
+      </p:ext>
+    </p:extLst>
+  </p:cSld>
+  <p:clrMapOvr>
+    <a:masterClrMapping/>
+  </p:clrMapOvr>
+</p:sld>
+</file>
+
+<file path=ppt/slides/slide3.xml><?xml version="1.0" encoding="utf-8"?>
 <p:sld xmlns:a="http://schemas.openxmlformats.org/drawingml/2006/main" xmlns:r="http://schemas.openxmlformats.org/officeDocument/2006/relationships" xmlns:p="http://schemas.openxmlformats.org/presentationml/2006/main">
   <p:cSld>
     <p:spTree>
@@ -3688,7 +4374,7 @@
 </p:sld>
 </file>
 
-<file path=ppt/slides/slide2.xml><?xml version="1.0" encoding="utf-8"?>
+<file path=ppt/slides/slide4.xml><?xml version="1.0" encoding="utf-8"?>
 <p:sld xmlns:a="http://schemas.openxmlformats.org/drawingml/2006/main" xmlns:r="http://schemas.openxmlformats.org/officeDocument/2006/relationships" xmlns:p="http://schemas.openxmlformats.org/presentationml/2006/main">
   <p:cSld>
     <p:spTree>

</xml_diff>